<commit_message>
presentation: wording update for design slides
</commit_message>
<xml_diff>
--- a/bms-poster-presentations/presentations/bms-application-design-nov8-2015.pptx
+++ b/bms-poster-presentations/presentations/bms-application-design-nov8-2015.pptx
@@ -5263,7 +5263,7 @@
             <a:pPr lvl="1"/>
             <a:r>
               <a:rPr lang="en-US" dirty="0" smtClean="0"/>
-              <a:t>In the example, “xfmr-6.dmd.inst” is referring to a specific sensor that publishes “electricity demand” data. The data type is reflected in the name components (in this case, “electricity – aggregated average”).</a:t>
+              <a:t>In the example, “xfmr-6.dmd.inst” is referring to a specific sensor in panel xfmr-6 that publishes “electricity demand” data. The data type is reflected in the later name components (in this case, “electricity – aggregation average”).</a:t>
             </a:r>
           </a:p>
           <a:p>
@@ -5381,7 +5381,15 @@
           <a:p>
             <a:r>
               <a:rPr lang="en-US" dirty="0" smtClean="0"/>
-              <a:t>Leaf nodes publish aggregated (min, sum, </a:t>
+              <a:t>Leaf nodes publish </a:t>
+            </a:r>
+            <a:r>
+              <a:rPr lang="en-US" dirty="0" smtClean="0"/>
+              <a:t>aggregation </a:t>
+            </a:r>
+            <a:r>
+              <a:rPr lang="en-US" dirty="0" smtClean="0"/>
+              <a:t>(min, sum, </a:t>
             </a:r>
             <a:r>
               <a:rPr lang="en-US" dirty="0" err="1" smtClean="0"/>
@@ -5403,7 +5411,15 @@
           <a:p>
             <a:r>
               <a:rPr lang="en-US" dirty="0" smtClean="0"/>
-              <a:t>Non-leaf nodes fetch the aggregated data from all of its children, and aggregate the data after all children respond. </a:t>
+              <a:t>Non-leaf nodes fetch the </a:t>
+            </a:r>
+            <a:r>
+              <a:rPr lang="en-US" dirty="0" smtClean="0"/>
+              <a:t>aggregation </a:t>
+            </a:r>
+            <a:r>
+              <a:rPr lang="en-US" dirty="0" smtClean="0"/>
+              <a:t>data from all of its children, and aggregate the data after all children respond. </a:t>
             </a:r>
           </a:p>
           <a:p>

</xml_diff>